<commit_message>
Fixed format in Project lessons, added 2 new robot lessons
</commit_message>
<xml_diff>
--- a/translations/en-us/Project/BackgroundResearch.pptx
+++ b/translations/en-us/Project/BackgroundResearch.pptx
@@ -206,7 +206,7 @@
           <a:p>
             <a:fld id="{A78B980B-A051-5042-A199-B77431CF73D3}" type="datetimeFigureOut">
               <a:rPr lang="en-US" smtClean="0"/>
-              <a:t>6/12/18</a:t>
+              <a:t>9/2/18</a:t>
             </a:fld>
             <a:endParaRPr lang="en-US"/>
           </a:p>
@@ -978,7 +978,7 @@
           <a:p>
             <a:fld id="{F6866A5A-0A55-4D5D-B5E8-F3D8DD37FB3A}" type="datetime1">
               <a:rPr lang="en-US" smtClean="0"/>
-              <a:t>6/12/18</a:t>
+              <a:t>9/2/18</a:t>
             </a:fld>
             <a:endParaRPr lang="en-US" dirty="0"/>
           </a:p>
@@ -1103,57 +1103,6 @@
           </a:prstGeom>
         </p:spPr>
       </p:pic>
-      <p:sp>
-        <p:nvSpPr>
-          <p:cNvPr id="9" name="Rectangle 8">
-            <a:extLst>
-              <a:ext uri="{FF2B5EF4-FFF2-40B4-BE49-F238E27FC236}">
-                <a16:creationId xmlns:a16="http://schemas.microsoft.com/office/drawing/2014/main" id="{D3F668BD-7077-43F8-82C1-E64A5DF178BD}"/>
-              </a:ext>
-            </a:extLst>
-          </p:cNvPr>
-          <p:cNvSpPr/>
-          <p:nvPr userDrawn="1"/>
-        </p:nvSpPr>
-        <p:spPr>
-          <a:xfrm>
-            <a:off x="-2358" y="6272819"/>
-            <a:ext cx="9141619" cy="64008"/>
-          </a:xfrm>
-          <a:prstGeom prst="rect">
-            <a:avLst/>
-          </a:prstGeom>
-          <a:solidFill>
-            <a:srgbClr val="24CF39"/>
-          </a:solidFill>
-          <a:ln>
-            <a:noFill/>
-          </a:ln>
-        </p:spPr>
-        <p:style>
-          <a:lnRef idx="2">
-            <a:schemeClr val="accent1">
-              <a:shade val="50000"/>
-            </a:schemeClr>
-          </a:lnRef>
-          <a:fillRef idx="1">
-            <a:schemeClr val="accent1"/>
-          </a:fillRef>
-          <a:effectRef idx="0">
-            <a:schemeClr val="accent1"/>
-          </a:effectRef>
-          <a:fontRef idx="minor">
-            <a:schemeClr val="lt1"/>
-          </a:fontRef>
-        </p:style>
-        <p:txBody>
-          <a:bodyPr/>
-          <a:lstStyle/>
-          <a:p>
-            <a:endParaRPr lang="en-US" dirty="0"/>
-          </a:p>
-        </p:txBody>
-      </p:sp>
     </p:spTree>
     <p:extLst>
       <p:ext uri="{BB962C8B-B14F-4D97-AF65-F5344CB8AC3E}">
@@ -1339,7 +1288,7 @@
           <a:p>
             <a:fld id="{8D0969ED-99E2-408E-BB07-DA94B73CF6BB}" type="datetime1">
               <a:rPr lang="en-US" smtClean="0"/>
-              <a:t>6/12/18</a:t>
+              <a:t>9/2/18</a:t>
             </a:fld>
             <a:endParaRPr lang="en-US" dirty="0"/>
           </a:p>
@@ -1597,7 +1546,7 @@
           <a:p>
             <a:fld id="{7803AC69-2A33-400C-BCAC-DAF57EE44F08}" type="datetime1">
               <a:rPr lang="en-US" smtClean="0"/>
-              <a:t>6/12/18</a:t>
+              <a:t>9/2/18</a:t>
             </a:fld>
             <a:endParaRPr lang="en-US" dirty="0"/>
           </a:p>
@@ -1885,7 +1834,7 @@
           <a:p>
             <a:fld id="{E0A18BA7-10AF-4A62-96A8-E5FA71B7E53B}" type="datetime1">
               <a:rPr lang="en-US" smtClean="0"/>
-              <a:t>6/12/18</a:t>
+              <a:t>9/2/18</a:t>
             </a:fld>
             <a:endParaRPr lang="en-US" dirty="0"/>
           </a:p>
@@ -2338,7 +2287,7 @@
             <a:fld id="{B61BEF0D-F0BB-DE4B-95CE-6DB70DBA9567}" type="datetimeFigureOut">
               <a:rPr lang="en-US" smtClean="0"/>
               <a:pPr/>
-              <a:t>6/12/18</a:t>
+              <a:t>9/2/18</a:t>
             </a:fld>
             <a:endParaRPr lang="en-US" dirty="0"/>
           </a:p>
@@ -2895,7 +2844,7 @@
           <a:p>
             <a:fld id="{7682FCB5-4B29-4F74-AF6D-1ECE9BAD89ED}" type="datetime1">
               <a:rPr lang="en-US" smtClean="0"/>
-              <a:t>6/12/18</a:t>
+              <a:t>9/2/18</a:t>
             </a:fld>
             <a:endParaRPr lang="en-US" dirty="0"/>
           </a:p>
@@ -3344,7 +3293,7 @@
           <a:p>
             <a:fld id="{073CCEA9-CC46-4A5E-9ACC-568CC7D20502}" type="datetime1">
               <a:rPr lang="en-US" smtClean="0"/>
-              <a:t>6/12/18</a:t>
+              <a:t>9/2/18</a:t>
             </a:fld>
             <a:endParaRPr lang="en-US" dirty="0"/>
           </a:p>
@@ -3529,7 +3478,7 @@
           <a:p>
             <a:fld id="{4495FE28-939C-4000-B10A-8CA6ED2FA30A}" type="datetime1">
               <a:rPr lang="en-US" smtClean="0"/>
-              <a:t>6/12/18</a:t>
+              <a:t>9/2/18</a:t>
             </a:fld>
             <a:endParaRPr lang="en-US" dirty="0"/>
           </a:p>
@@ -3652,7 +3601,7 @@
           <a:p>
             <a:fld id="{46203042-3756-43CC-912F-20912042B569}" type="datetime1">
               <a:rPr lang="en-US" smtClean="0"/>
-              <a:t>6/12/18</a:t>
+              <a:t>9/2/18</a:t>
             </a:fld>
             <a:endParaRPr lang="en-US" dirty="0"/>
           </a:p>
@@ -4058,7 +4007,7 @@
           <a:p>
             <a:fld id="{657503B7-C034-4A63-A905-C2AAE1E4006F}" type="datetime1">
               <a:rPr lang="en-US" smtClean="0"/>
-              <a:t>6/12/18</a:t>
+              <a:t>9/2/18</a:t>
             </a:fld>
             <a:endParaRPr lang="en-US" dirty="0"/>
           </a:p>
@@ -4375,7 +4324,7 @@
           <a:p>
             <a:fld id="{7F4269FD-51AD-40D9-86B1-068AADC977AB}" type="datetime1">
               <a:rPr lang="en-US" smtClean="0"/>
-              <a:t>6/12/18</a:t>
+              <a:t>9/2/18</a:t>
             </a:fld>
             <a:endParaRPr lang="en-US" dirty="0"/>
           </a:p>
@@ -4726,7 +4675,7 @@
           <a:p>
             <a:fld id="{BDD6E278-302A-499C-9E64-959DDB257AAA}" type="datetime1">
               <a:rPr lang="en-US" smtClean="0"/>
-              <a:t>6/12/18</a:t>
+              <a:t>9/2/18</a:t>
             </a:fld>
             <a:endParaRPr lang="en-US" dirty="0"/>
           </a:p>
@@ -4825,57 +4774,6 @@
               <a:pPr/>
               <a:t>‹#›</a:t>
             </a:fld>
-            <a:endParaRPr lang="en-US" dirty="0"/>
-          </a:p>
-        </p:txBody>
-      </p:sp>
-      <p:sp>
-        <p:nvSpPr>
-          <p:cNvPr id="15" name="Rectangle 14">
-            <a:extLst>
-              <a:ext uri="{FF2B5EF4-FFF2-40B4-BE49-F238E27FC236}">
-                <a16:creationId xmlns:a16="http://schemas.microsoft.com/office/drawing/2014/main" id="{13012697-A2FD-465B-B907-452079313A19}"/>
-              </a:ext>
-            </a:extLst>
-          </p:cNvPr>
-          <p:cNvSpPr/>
-          <p:nvPr userDrawn="1"/>
-        </p:nvSpPr>
-        <p:spPr>
-          <a:xfrm>
-            <a:off x="-1" y="6273337"/>
-            <a:ext cx="9144001" cy="65999"/>
-          </a:xfrm>
-          <a:prstGeom prst="rect">
-            <a:avLst/>
-          </a:prstGeom>
-          <a:solidFill>
-            <a:srgbClr val="24CF39"/>
-          </a:solidFill>
-          <a:ln>
-            <a:noFill/>
-          </a:ln>
-        </p:spPr>
-        <p:style>
-          <a:lnRef idx="2">
-            <a:schemeClr val="accent1">
-              <a:shade val="50000"/>
-            </a:schemeClr>
-          </a:lnRef>
-          <a:fillRef idx="1">
-            <a:schemeClr val="accent1"/>
-          </a:fillRef>
-          <a:effectRef idx="0">
-            <a:schemeClr val="accent1"/>
-          </a:effectRef>
-          <a:fontRef idx="minor">
-            <a:schemeClr val="lt1"/>
-          </a:fontRef>
-        </p:style>
-        <p:txBody>
-          <a:bodyPr/>
-          <a:lstStyle/>
-          <a:p>
             <a:endParaRPr lang="en-US" dirty="0"/>
           </a:p>
         </p:txBody>

</xml_diff>

<commit_message>
Updated all Project lessons with new information
</commit_message>
<xml_diff>
--- a/translations/en-us/Project/BackgroundResearch.pptx
+++ b/translations/en-us/Project/BackgroundResearch.pptx
@@ -206,7 +206,7 @@
           <a:p>
             <a:fld id="{A78B980B-A051-5042-A199-B77431CF73D3}" type="datetimeFigureOut">
               <a:rPr lang="en-US" smtClean="0"/>
-              <a:t>9/2/18</a:t>
+              <a:t>10/27/22</a:t>
             </a:fld>
             <a:endParaRPr lang="en-US"/>
           </a:p>
@@ -976,9 +976,9 @@
             </a:lvl1pPr>
           </a:lstStyle>
           <a:p>
-            <a:fld id="{F6866A5A-0A55-4D5D-B5E8-F3D8DD37FB3A}" type="datetime1">
+            <a:fld id="{8DF8F508-4D21-7342-AE74-B2858C88F410}" type="datetime1">
               <a:rPr lang="en-US" smtClean="0"/>
-              <a:t>9/2/18</a:t>
+              <a:t>10/27/22</a:t>
             </a:fld>
             <a:endParaRPr lang="en-US" dirty="0"/>
           </a:p>
@@ -1020,7 +1020,7 @@
           <a:p>
             <a:r>
               <a:rPr lang="en-US"/>
-              <a:t>© 2018, FLL Tutorials (Last Edit 6/11/2018)</a:t>
+              <a:t>© 2022, FLL Tutorials</a:t>
             </a:r>
             <a:endParaRPr lang="en-US" dirty="0"/>
           </a:p>
@@ -1286,9 +1286,9 @@
           <a:bodyPr/>
           <a:lstStyle/>
           <a:p>
-            <a:fld id="{8D0969ED-99E2-408E-BB07-DA94B73CF6BB}" type="datetime1">
+            <a:fld id="{3A1C6816-60C2-4547-8D19-A8F6D1FDAB7B}" type="datetime1">
               <a:rPr lang="en-US" smtClean="0"/>
-              <a:t>9/2/18</a:t>
+              <a:t>10/27/22</a:t>
             </a:fld>
             <a:endParaRPr lang="en-US" dirty="0"/>
           </a:p>
@@ -1319,7 +1319,7 @@
           <a:p>
             <a:r>
               <a:rPr lang="en-US"/>
-              <a:t>© 2018, FLL Tutorials (Last Edit 6/11/2018)</a:t>
+              <a:t>© 2022, FLL Tutorials</a:t>
             </a:r>
             <a:endParaRPr lang="en-US" dirty="0"/>
           </a:p>
@@ -1544,9 +1544,9 @@
             </a:lvl1pPr>
           </a:lstStyle>
           <a:p>
-            <a:fld id="{7803AC69-2A33-400C-BCAC-DAF57EE44F08}" type="datetime1">
+            <a:fld id="{63FBB26E-D81B-8540-9838-BB6139DDB7E7}" type="datetime1">
               <a:rPr lang="en-US" smtClean="0"/>
-              <a:t>9/2/18</a:t>
+              <a:t>10/27/22</a:t>
             </a:fld>
             <a:endParaRPr lang="en-US" dirty="0"/>
           </a:p>
@@ -1577,7 +1577,7 @@
           <a:p>
             <a:r>
               <a:rPr lang="en-US"/>
-              <a:t>© 2018, FLL Tutorials (Last Edit 6/11/2018)</a:t>
+              <a:t>© 2022, FLL Tutorials</a:t>
             </a:r>
             <a:endParaRPr lang="en-US" dirty="0"/>
           </a:p>
@@ -1832,9 +1832,9 @@
             </a:lvl1pPr>
           </a:lstStyle>
           <a:p>
-            <a:fld id="{E0A18BA7-10AF-4A62-96A8-E5FA71B7E53B}" type="datetime1">
+            <a:fld id="{20922FB9-1BF8-5448-A690-6622CA106328}" type="datetime1">
               <a:rPr lang="en-US" smtClean="0"/>
-              <a:t>9/2/18</a:t>
+              <a:t>10/27/22</a:t>
             </a:fld>
             <a:endParaRPr lang="en-US" dirty="0"/>
           </a:p>
@@ -1879,7 +1879,7 @@
           <a:p>
             <a:r>
               <a:rPr lang="en-US"/>
-              <a:t>© 2018, FLL Tutorials (Last Edit 6/11/2018)</a:t>
+              <a:t>© 2022, FLL Tutorials</a:t>
             </a:r>
             <a:endParaRPr lang="en-US" dirty="0"/>
           </a:p>
@@ -2287,7 +2287,7 @@
             <a:fld id="{B61BEF0D-F0BB-DE4B-95CE-6DB70DBA9567}" type="datetimeFigureOut">
               <a:rPr lang="en-US" smtClean="0"/>
               <a:pPr/>
-              <a:t>9/2/18</a:t>
+              <a:t>10/27/22</a:t>
             </a:fld>
             <a:endParaRPr lang="en-US" dirty="0"/>
           </a:p>
@@ -2842,9 +2842,9 @@
           <a:bodyPr/>
           <a:lstStyle/>
           <a:p>
-            <a:fld id="{7682FCB5-4B29-4F74-AF6D-1ECE9BAD89ED}" type="datetime1">
+            <a:fld id="{312FF397-931F-3246-A8B2-56200D7F469E}" type="datetime1">
               <a:rPr lang="en-US" smtClean="0"/>
-              <a:t>9/2/18</a:t>
+              <a:t>10/27/22</a:t>
             </a:fld>
             <a:endParaRPr lang="en-US" dirty="0"/>
           </a:p>
@@ -2875,7 +2875,7 @@
           <a:p>
             <a:r>
               <a:rPr lang="en-US"/>
-              <a:t>© 2018, FLL Tutorials (Last Edit 6/11/2018)</a:t>
+              <a:t>© 2022, FLL Tutorials</a:t>
             </a:r>
             <a:endParaRPr lang="en-US" dirty="0"/>
           </a:p>
@@ -3291,9 +3291,9 @@
           <a:bodyPr/>
           <a:lstStyle/>
           <a:p>
-            <a:fld id="{073CCEA9-CC46-4A5E-9ACC-568CC7D20502}" type="datetime1">
+            <a:fld id="{C14B6FDC-39B6-184E-9F82-7351E445439C}" type="datetime1">
               <a:rPr lang="en-US" smtClean="0"/>
-              <a:t>9/2/18</a:t>
+              <a:t>10/27/22</a:t>
             </a:fld>
             <a:endParaRPr lang="en-US" dirty="0"/>
           </a:p>
@@ -3324,7 +3324,7 @@
           <a:p>
             <a:r>
               <a:rPr lang="en-US"/>
-              <a:t>© 2018, FLL Tutorials (Last Edit 6/11/2018)</a:t>
+              <a:t>© 2022, FLL Tutorials</a:t>
             </a:r>
             <a:endParaRPr lang="en-US" dirty="0"/>
           </a:p>
@@ -3476,9 +3476,9 @@
           <a:bodyPr/>
           <a:lstStyle/>
           <a:p>
-            <a:fld id="{4495FE28-939C-4000-B10A-8CA6ED2FA30A}" type="datetime1">
+            <a:fld id="{8CEF6C34-FD0C-2F4B-B7B7-D08165494B81}" type="datetime1">
               <a:rPr lang="en-US" smtClean="0"/>
-              <a:t>9/2/18</a:t>
+              <a:t>10/27/22</a:t>
             </a:fld>
             <a:endParaRPr lang="en-US" dirty="0"/>
           </a:p>
@@ -3509,7 +3509,7 @@
           <a:p>
             <a:r>
               <a:rPr lang="en-US"/>
-              <a:t>© 2018, FLL Tutorials (Last Edit 6/11/2018)</a:t>
+              <a:t>© 2022, FLL Tutorials</a:t>
             </a:r>
             <a:endParaRPr lang="en-US" dirty="0"/>
           </a:p>
@@ -3599,9 +3599,9 @@
           <a:bodyPr/>
           <a:lstStyle/>
           <a:p>
-            <a:fld id="{46203042-3756-43CC-912F-20912042B569}" type="datetime1">
+            <a:fld id="{59DA8EE6-27DC-9B4B-A87A-820D1A29E2B2}" type="datetime1">
               <a:rPr lang="en-US" smtClean="0"/>
-              <a:t>9/2/18</a:t>
+              <a:t>10/27/22</a:t>
             </a:fld>
             <a:endParaRPr lang="en-US" dirty="0"/>
           </a:p>
@@ -3632,7 +3632,7 @@
           <a:p>
             <a:r>
               <a:rPr lang="en-US"/>
-              <a:t>© 2018, FLL Tutorials (Last Edit 6/11/2018)</a:t>
+              <a:t>© 2022, FLL Tutorials</a:t>
             </a:r>
             <a:endParaRPr lang="en-US" dirty="0"/>
           </a:p>
@@ -4005,9 +4005,9 @@
             </a:lvl1pPr>
           </a:lstStyle>
           <a:p>
-            <a:fld id="{657503B7-C034-4A63-A905-C2AAE1E4006F}" type="datetime1">
+            <a:fld id="{0A96E927-6413-0C4F-9909-DA9461970837}" type="datetime1">
               <a:rPr lang="en-US" smtClean="0"/>
-              <a:t>9/2/18</a:t>
+              <a:t>10/27/22</a:t>
             </a:fld>
             <a:endParaRPr lang="en-US" dirty="0"/>
           </a:p>
@@ -4049,7 +4049,7 @@
           <a:p>
             <a:r>
               <a:rPr lang="en-US"/>
-              <a:t>© 2018, FLL Tutorials (Last Edit 6/11/2018)</a:t>
+              <a:t>© 2022, FLL Tutorials</a:t>
             </a:r>
             <a:endParaRPr lang="en-US" dirty="0"/>
           </a:p>
@@ -4322,9 +4322,9 @@
           <a:bodyPr/>
           <a:lstStyle/>
           <a:p>
-            <a:fld id="{7F4269FD-51AD-40D9-86B1-068AADC977AB}" type="datetime1">
+            <a:fld id="{F9392D93-0038-4E4D-A72D-AD3DB48F5D70}" type="datetime1">
               <a:rPr lang="en-US" smtClean="0"/>
-              <a:t>9/2/18</a:t>
+              <a:t>10/27/22</a:t>
             </a:fld>
             <a:endParaRPr lang="en-US" dirty="0"/>
           </a:p>
@@ -4355,7 +4355,7 @@
           <a:p>
             <a:r>
               <a:rPr lang="en-US"/>
-              <a:t>© 2018, FLL Tutorials (Last Edit 6/11/2018)</a:t>
+              <a:t>© 2022, FLL Tutorials</a:t>
             </a:r>
             <a:endParaRPr lang="en-US" dirty="0"/>
           </a:p>
@@ -4673,9 +4673,9 @@
             </a:lvl1pPr>
           </a:lstStyle>
           <a:p>
-            <a:fld id="{BDD6E278-302A-499C-9E64-959DDB257AAA}" type="datetime1">
+            <a:fld id="{ED3E15E7-B6ED-9144-B345-DD2E1F013272}" type="datetime1">
               <a:rPr lang="en-US" smtClean="0"/>
-              <a:t>9/2/18</a:t>
+              <a:t>10/27/22</a:t>
             </a:fld>
             <a:endParaRPr lang="en-US" dirty="0"/>
           </a:p>
@@ -4723,7 +4723,7 @@
           <a:p>
             <a:r>
               <a:rPr lang="en-US"/>
-              <a:t>© 2018, FLL Tutorials (Last Edit 6/11/2018)</a:t>
+              <a:t>© 2022, FLL Tutorials</a:t>
             </a:r>
             <a:endParaRPr lang="en-US" dirty="0"/>
           </a:p>
@@ -5403,7 +5403,7 @@
           <a:p>
             <a:r>
               <a:rPr lang="en-US"/>
-              <a:t>© 2018, FLL Tutorials (Last Edit 6/11/2018)</a:t>
+              <a:t>© 2022, FLL Tutorials</a:t>
             </a:r>
             <a:endParaRPr lang="en-US" dirty="0"/>
           </a:p>
@@ -5566,7 +5566,7 @@
           <a:p>
             <a:r>
               <a:rPr lang="en-US"/>
-              <a:t>© 2018, FLL Tutorials (Last Edit 6/11/2018)</a:t>
+              <a:t>© 2022, FLL Tutorials</a:t>
             </a:r>
             <a:endParaRPr lang="en-US" dirty="0"/>
           </a:p>
@@ -5888,7 +5888,7 @@
             </a:pPr>
             <a:r>
               <a:rPr lang="en-US" sz="2300" dirty="0"/>
-              <a:t> Use a variety of sources including websites books, magazines, reports, professionals</a:t>
+              <a:t>Use a variety of sources including websites books, magazines, reports, professionals</a:t>
             </a:r>
           </a:p>
           <a:p>
@@ -5901,7 +5901,7 @@
             </a:pPr>
             <a:r>
               <a:rPr lang="en-US" sz="2300" dirty="0"/>
-              <a:t> Go on fieldtrips</a:t>
+              <a:t>Go on fieldtrips</a:t>
             </a:r>
           </a:p>
           <a:p>
@@ -5914,7 +5914,7 @@
             </a:pPr>
             <a:r>
               <a:rPr lang="en-US" sz="2300" dirty="0"/>
-              <a:t> Collect your own survey data</a:t>
+              <a:t>Collect your own survey data</a:t>
             </a:r>
           </a:p>
           <a:p>
@@ -5927,7 +5927,7 @@
             </a:pPr>
             <a:r>
               <a:rPr lang="en-US" sz="2300" dirty="0"/>
-              <a:t> Remember that all sources need to be cited</a:t>
+              <a:t>Remember that all sources need to be cited</a:t>
             </a:r>
           </a:p>
           <a:p>
@@ -5961,7 +5961,7 @@
           <a:p>
             <a:r>
               <a:rPr lang="en-US"/>
-              <a:t>© 2018, FLL Tutorials (Last Edit 6/11/2018)</a:t>
+              <a:t>© 2022, FLL Tutorials</a:t>
             </a:r>
             <a:endParaRPr lang="en-US" dirty="0"/>
           </a:p>
@@ -5996,49 +5996,6 @@
           </a:p>
         </p:txBody>
       </p:sp>
-      <p:pic>
-        <p:nvPicPr>
-          <p:cNvPr id="8" name="Picture 7"/>
-          <p:cNvPicPr>
-            <a:picLocks noChangeAspect="1"/>
-          </p:cNvPicPr>
-          <p:nvPr/>
-        </p:nvPicPr>
-        <p:blipFill rotWithShape="1">
-          <a:blip r:embed="rId3" cstate="print">
-            <a:extLst>
-              <a:ext uri="{28A0092B-C50C-407E-A947-70E740481C1C}">
-                <a14:useLocalDpi xmlns:a14="http://schemas.microsoft.com/office/drawing/2010/main"/>
-              </a:ext>
-            </a:extLst>
-          </a:blip>
-          <a:srcRect/>
-          <a:stretch/>
-        </p:blipFill>
-        <p:spPr>
-          <a:xfrm>
-            <a:off x="4356095" y="4827294"/>
-            <a:ext cx="4567187" cy="1255362"/>
-          </a:xfrm>
-          <a:prstGeom prst="rect">
-            <a:avLst/>
-          </a:prstGeom>
-          <a:ln w="38100" cap="sq">
-            <a:solidFill>
-              <a:srgbClr val="000000"/>
-            </a:solidFill>
-            <a:prstDash val="solid"/>
-            <a:miter lim="800000"/>
-          </a:ln>
-          <a:effectLst>
-            <a:outerShdw blurRad="50800" dist="38100" dir="2700000" algn="tl" rotWithShape="0">
-              <a:srgbClr val="000000">
-                <a:alpha val="43000"/>
-              </a:srgbClr>
-            </a:outerShdw>
-          </a:effectLst>
-        </p:spPr>
-      </p:pic>
       <p:pic>
         <p:nvPicPr>
           <p:cNvPr id="9" name="Picture 8">
@@ -6054,7 +6011,7 @@
           <p:nvPr/>
         </p:nvPicPr>
         <p:blipFill>
-          <a:blip r:embed="rId4" cstate="print">
+          <a:blip r:embed="rId3" cstate="print">
             <a:extLst>
               <a:ext uri="{28A0092B-C50C-407E-A947-70E740481C1C}">
                 <a14:useLocalDpi xmlns:a14="http://schemas.microsoft.com/office/drawing/2010/main"/>
@@ -6075,52 +6032,6 @@
           </a:prstGeom>
         </p:spPr>
       </p:pic>
-      <p:sp>
-        <p:nvSpPr>
-          <p:cNvPr id="10" name="Rectangle 9"/>
-          <p:cNvSpPr/>
-          <p:nvPr/>
-        </p:nvSpPr>
-        <p:spPr>
-          <a:xfrm>
-            <a:off x="4426527" y="5278582"/>
-            <a:ext cx="4291446" cy="457200"/>
-          </a:xfrm>
-          <a:prstGeom prst="rect">
-            <a:avLst/>
-          </a:prstGeom>
-          <a:noFill/>
-          <a:ln w="38100">
-            <a:solidFill>
-              <a:srgbClr val="FF0000"/>
-            </a:solidFill>
-          </a:ln>
-        </p:spPr>
-        <p:style>
-          <a:lnRef idx="2">
-            <a:schemeClr val="accent1">
-              <a:shade val="50000"/>
-            </a:schemeClr>
-          </a:lnRef>
-          <a:fillRef idx="1">
-            <a:schemeClr val="accent1"/>
-          </a:fillRef>
-          <a:effectRef idx="0">
-            <a:schemeClr val="accent1"/>
-          </a:effectRef>
-          <a:fontRef idx="minor">
-            <a:schemeClr val="lt1"/>
-          </a:fontRef>
-        </p:style>
-        <p:txBody>
-          <a:bodyPr rtlCol="0" anchor="ctr"/>
-          <a:lstStyle/>
-          <a:p>
-            <a:pPr algn="ctr"/>
-            <a:endParaRPr lang="en-US"/>
-          </a:p>
-        </p:txBody>
-      </p:sp>
     </p:spTree>
     <p:extLst>
       <p:ext uri="{BB962C8B-B14F-4D97-AF65-F5344CB8AC3E}">
@@ -6316,7 +6227,7 @@
           <a:p>
             <a:r>
               <a:rPr lang="en-US"/>
-              <a:t>© 2018, FLL Tutorials (Last Edit 6/11/2018)</a:t>
+              <a:t>© 2022, FLL Tutorials</a:t>
             </a:r>
             <a:endParaRPr lang="en-US" dirty="0"/>
           </a:p>
@@ -6476,7 +6387,7 @@
           <a:p>
             <a:r>
               <a:rPr lang="en-US"/>
-              <a:t>© 2018, FLL Tutorials (Last Edit 6/11/2018)</a:t>
+              <a:t>© 2022, FLL Tutorials</a:t>
             </a:r>
             <a:endParaRPr lang="en-US" dirty="0"/>
           </a:p>
@@ -6702,7 +6613,7 @@
           <a:p>
             <a:r>
               <a:rPr lang="en-US"/>
-              <a:t>© 2018, FLL Tutorials (Last Edit 6/11/2018)</a:t>
+              <a:t>© 2022, FLL Tutorials</a:t>
             </a:r>
             <a:endParaRPr lang="en-US" dirty="0"/>
           </a:p>
@@ -6951,7 +6862,7 @@
           <a:p>
             <a:r>
               <a:rPr lang="en-US"/>
-              <a:t>© 2018, FLL Tutorials (Last Edit 6/11/2018)</a:t>
+              <a:t>© 2022, FLL Tutorials</a:t>
             </a:r>
             <a:endParaRPr lang="en-US" dirty="0"/>
           </a:p>
@@ -7229,7 +7140,7 @@
           <a:p>
             <a:r>
               <a:rPr lang="en-US"/>
-              <a:t>© 2018, FLL Tutorials (Last Edit 6/11/2018)</a:t>
+              <a:t>© 2022, FLL Tutorials</a:t>
             </a:r>
             <a:endParaRPr lang="en-US" dirty="0"/>
           </a:p>
@@ -7430,7 +7341,7 @@
           <a:p>
             <a:r>
               <a:rPr lang="en-US"/>
-              <a:t>© 2018, FLL Tutorials (Last Edit 6/11/2018)</a:t>
+              <a:t>© 2022, FLL Tutorials</a:t>
             </a:r>
             <a:endParaRPr lang="en-US" dirty="0"/>
           </a:p>

</xml_diff>